<commit_message>
acpt: add scenario for Series.line
</commit_message>
<xml_diff>
--- a/features/steps/test_files/cht-series-props.pptx
+++ b/features/steps/test_files/cht-series-props.pptx
@@ -201,6 +201,11 @@
           </c:tx>
           <c:spPr>
             <a:noFill/>
+            <a:ln w="12700">
+              <a:solidFill>
+                <a:schemeClr val="tx1"/>
+              </a:solidFill>
+            </a:ln>
           </c:spPr>
           <c:invertIfNegative val="0"/>
           <c:cat>
@@ -263,6 +268,11 @@
             <a:solidFill>
               <a:srgbClr val="FF6600"/>
             </a:solidFill>
+            <a:ln w="25400">
+              <a:solidFill>
+                <a:srgbClr val="0000FF"/>
+              </a:solidFill>
+            </a:ln>
           </c:spPr>
           <c:invertIfNegative val="0"/>
           <c:cat>
@@ -325,6 +335,11 @@
             <a:solidFill>
               <a:schemeClr val="accent1"/>
             </a:solidFill>
+            <a:ln w="25400">
+              <a:solidFill>
+                <a:schemeClr val="accent6"/>
+              </a:solidFill>
+            </a:ln>
           </c:spPr>
           <c:invertIfNegative val="0"/>
           <c:cat>
@@ -378,11 +393,11 @@
           <c:showBubbleSize val="0"/>
         </c:dLbls>
         <c:gapWidth val="150"/>
-        <c:axId val="-2042680552"/>
-        <c:axId val="-2042681640"/>
+        <c:axId val="2108394024"/>
+        <c:axId val="2028106952"/>
       </c:barChart>
       <c:catAx>
-        <c:axId val="-2042680552"/>
+        <c:axId val="2108394024"/>
         <c:scaling>
           <c:orientation val="minMax"/>
         </c:scaling>
@@ -391,7 +406,7 @@
         <c:majorTickMark val="out"/>
         <c:minorTickMark val="none"/>
         <c:tickLblPos val="nextTo"/>
-        <c:crossAx val="-2042681640"/>
+        <c:crossAx val="2028106952"/>
         <c:crosses val="autoZero"/>
         <c:auto val="1"/>
         <c:lblAlgn val="ctr"/>
@@ -399,7 +414,7 @@
         <c:noMultiLvlLbl val="0"/>
       </c:catAx>
       <c:valAx>
-        <c:axId val="-2042681640"/>
+        <c:axId val="2028106952"/>
         <c:scaling>
           <c:orientation val="minMax"/>
         </c:scaling>
@@ -410,7 +425,7 @@
         <c:majorTickMark val="out"/>
         <c:minorTickMark val="none"/>
         <c:tickLblPos val="nextTo"/>
-        <c:crossAx val="-2042680552"/>
+        <c:crossAx val="2108394024"/>
         <c:crosses val="autoZero"/>
         <c:crossBetween val="between"/>
       </c:valAx>
@@ -770,7 +785,7 @@
           <p:nvPr>
             <p:extLst>
               <p:ext uri="{D42A27DB-BD31-4B8C-83A1-F6EECF244321}">
-                <p14:modId xmlns:p14="http://schemas.microsoft.com/office/powerpoint/2010/main" val="1331279381"/>
+                <p14:modId xmlns:p14="http://schemas.microsoft.com/office/powerpoint/2010/main" val="1511604511"/>
               </p:ext>
             </p:extLst>
           </p:nvPr>
@@ -795,6 +810,13 @@
   <p:clrMapOvr>
     <a:masterClrMapping/>
   </p:clrMapOvr>
+  <p:timing>
+    <p:tnLst>
+      <p:par>
+        <p:cTn xmlns:p14="http://schemas.microsoft.com/office/powerpoint/2010/main" id="1" dur="indefinite" restart="never" nodeType="tmRoot"/>
+      </p:par>
+    </p:tnLst>
+  </p:timing>
 </p:sld>
 </file>
 

</xml_diff>

<commit_message>
acpt: add scenario for Series.values
</commit_message>
<xml_diff>
--- a/features/steps/test_files/cht-series-props.pptx
+++ b/features/steps/test_files/cht-series-props.pptx
@@ -6,6 +6,7 @@
   </p:sldMasterIdLst>
   <p:sldIdLst>
     <p:sldId id="256" r:id="rId2"/>
+    <p:sldId id="257" r:id="rId3"/>
   </p:sldIdLst>
   <p:sldSz cx="9144000" cy="6858000" type="screen4x3"/>
   <p:notesSz cx="6858000" cy="9144000"/>
@@ -142,6 +143,7 @@
               </c:strCache>
             </c:strRef>
           </c:tx>
+          <c:invertIfNegative val="1"/>
           <c:cat>
             <c:strRef>
               <c:f>Sheet1!$A$2:$A$5</c:f>
@@ -392,11 +394,11 @@
           <c:showBubbleSize val="0"/>
         </c:dLbls>
         <c:gapWidth val="150"/>
-        <c:axId val="2108394024"/>
-        <c:axId val="2028106952"/>
+        <c:axId val="-2092787480"/>
+        <c:axId val="-2092782696"/>
       </c:barChart>
       <c:catAx>
-        <c:axId val="2108394024"/>
+        <c:axId val="-2092787480"/>
         <c:scaling>
           <c:orientation val="minMax"/>
         </c:scaling>
@@ -405,7 +407,7 @@
         <c:majorTickMark val="out"/>
         <c:minorTickMark val="none"/>
         <c:tickLblPos val="nextTo"/>
-        <c:crossAx val="2028106952"/>
+        <c:crossAx val="-2092782696"/>
         <c:crosses val="autoZero"/>
         <c:auto val="1"/>
         <c:lblAlgn val="ctr"/>
@@ -413,7 +415,7 @@
         <c:noMultiLvlLbl val="0"/>
       </c:catAx>
       <c:valAx>
-        <c:axId val="2028106952"/>
+        <c:axId val="-2092782696"/>
         <c:scaling>
           <c:orientation val="minMax"/>
         </c:scaling>
@@ -424,7 +426,252 @@
         <c:majorTickMark val="out"/>
         <c:minorTickMark val="none"/>
         <c:tickLblPos val="nextTo"/>
-        <c:crossAx val="2108394024"/>
+        <c:crossAx val="-2092787480"/>
+        <c:crosses val="autoZero"/>
+        <c:crossBetween val="between"/>
+      </c:valAx>
+    </c:plotArea>
+    <c:legend>
+      <c:legendPos val="r"/>
+      <c:layout/>
+      <c:overlay val="0"/>
+    </c:legend>
+    <c:plotVisOnly val="1"/>
+    <c:dispBlanksAs val="gap"/>
+    <c:showDLblsOverMax val="0"/>
+  </c:chart>
+  <c:txPr>
+    <a:bodyPr/>
+    <a:lstStyle/>
+    <a:p>
+      <a:pPr>
+        <a:defRPr sz="1800"/>
+      </a:pPr>
+      <a:endParaRPr lang="en-US"/>
+    </a:p>
+  </c:txPr>
+  <c:externalData r:id="rId1">
+    <c:autoUpdate val="0"/>
+  </c:externalData>
+</c:chartSpace>
+</file>
+
+<file path=ppt/charts/chart2.xml><?xml version="1.0" encoding="utf-8"?>
+<c:chartSpace xmlns:c="http://schemas.openxmlformats.org/drawingml/2006/chart" xmlns:a="http://schemas.openxmlformats.org/drawingml/2006/main" xmlns:r="http://schemas.openxmlformats.org/officeDocument/2006/relationships">
+  <c:date1904 val="0"/>
+  <c:lang val="en-US"/>
+  <c:roundedCorners val="0"/>
+  <mc:AlternateContent xmlns:mc="http://schemas.openxmlformats.org/markup-compatibility/2006">
+    <mc:Choice xmlns:c14="http://schemas.microsoft.com/office/drawing/2007/8/2/chart" Requires="c14">
+      <c14:style val="118"/>
+    </mc:Choice>
+    <mc:Fallback>
+      <c:style val="18"/>
+    </mc:Fallback>
+  </mc:AlternateContent>
+  <c:chart>
+    <c:autoTitleDeleted val="0"/>
+    <c:plotArea>
+      <c:layout/>
+      <c:barChart>
+        <c:barDir val="bar"/>
+        <c:grouping val="clustered"/>
+        <c:varyColors val="0"/>
+        <c:ser>
+          <c:idx val="0"/>
+          <c:order val="0"/>
+          <c:tx>
+            <c:strRef>
+              <c:f>Sheet1!$B$1</c:f>
+              <c:strCache>
+                <c:ptCount val="1"/>
+                <c:pt idx="0">
+                  <c:v>Series 1</c:v>
+                </c:pt>
+              </c:strCache>
+            </c:strRef>
+          </c:tx>
+          <c:invertIfNegative val="0"/>
+          <c:cat>
+            <c:strRef>
+              <c:f>Sheet1!$A$2:$A$4</c:f>
+              <c:strCache>
+                <c:ptCount val="3"/>
+                <c:pt idx="0">
+                  <c:v>Foo</c:v>
+                </c:pt>
+                <c:pt idx="1">
+                  <c:v>Bar</c:v>
+                </c:pt>
+                <c:pt idx="2">
+                  <c:v>Baz</c:v>
+                </c:pt>
+              </c:strCache>
+            </c:strRef>
+          </c:cat>
+          <c:val>
+            <c:numRef>
+              <c:f>Sheet1!$B$2:$B$4</c:f>
+              <c:numCache>
+                <c:formatCode>General</c:formatCode>
+                <c:ptCount val="3"/>
+                <c:pt idx="0">
+                  <c:v>1.2</c:v>
+                </c:pt>
+                <c:pt idx="1">
+                  <c:v>2.3</c:v>
+                </c:pt>
+                <c:pt idx="2">
+                  <c:v>3.4</c:v>
+                </c:pt>
+              </c:numCache>
+            </c:numRef>
+          </c:val>
+        </c:ser>
+        <c:ser>
+          <c:idx val="1"/>
+          <c:order val="1"/>
+          <c:tx>
+            <c:strRef>
+              <c:f>Sheet1!$C$1</c:f>
+              <c:strCache>
+                <c:ptCount val="1"/>
+                <c:pt idx="0">
+                  <c:v>Series 2</c:v>
+                </c:pt>
+              </c:strCache>
+            </c:strRef>
+          </c:tx>
+          <c:invertIfNegative val="0"/>
+          <c:cat>
+            <c:strRef>
+              <c:f>Sheet1!$A$2:$A$4</c:f>
+              <c:strCache>
+                <c:ptCount val="3"/>
+                <c:pt idx="0">
+                  <c:v>Foo</c:v>
+                </c:pt>
+                <c:pt idx="1">
+                  <c:v>Bar</c:v>
+                </c:pt>
+                <c:pt idx="2">
+                  <c:v>Baz</c:v>
+                </c:pt>
+              </c:strCache>
+            </c:strRef>
+          </c:cat>
+          <c:val>
+            <c:numRef>
+              <c:f>Sheet1!$C$2:$C$4</c:f>
+              <c:numCache>
+                <c:formatCode>General</c:formatCode>
+                <c:ptCount val="3"/>
+                <c:pt idx="0">
+                  <c:v>4.5</c:v>
+                </c:pt>
+                <c:pt idx="1">
+                  <c:v>5.6</c:v>
+                </c:pt>
+                <c:pt idx="2">
+                  <c:v>6.7</c:v>
+                </c:pt>
+              </c:numCache>
+            </c:numRef>
+          </c:val>
+        </c:ser>
+        <c:ser>
+          <c:idx val="2"/>
+          <c:order val="2"/>
+          <c:tx>
+            <c:strRef>
+              <c:f>Sheet1!$D$1</c:f>
+              <c:strCache>
+                <c:ptCount val="1"/>
+                <c:pt idx="0">
+                  <c:v>Series 3</c:v>
+                </c:pt>
+              </c:strCache>
+            </c:strRef>
+          </c:tx>
+          <c:invertIfNegative val="0"/>
+          <c:cat>
+            <c:strRef>
+              <c:f>Sheet1!$A$2:$A$4</c:f>
+              <c:strCache>
+                <c:ptCount val="3"/>
+                <c:pt idx="0">
+                  <c:v>Foo</c:v>
+                </c:pt>
+                <c:pt idx="1">
+                  <c:v>Bar</c:v>
+                </c:pt>
+                <c:pt idx="2">
+                  <c:v>Baz</c:v>
+                </c:pt>
+              </c:strCache>
+            </c:strRef>
+          </c:cat>
+          <c:val>
+            <c:numRef>
+              <c:f>Sheet1!$D$2:$D$4</c:f>
+              <c:numCache>
+                <c:formatCode>General</c:formatCode>
+                <c:ptCount val="3"/>
+                <c:pt idx="0">
+                  <c:v>7.8</c:v>
+                </c:pt>
+                <c:pt idx="1">
+                  <c:v>8.9</c:v>
+                </c:pt>
+                <c:pt idx="2" formatCode="0.0">
+                  <c:v>9.0</c:v>
+                </c:pt>
+              </c:numCache>
+            </c:numRef>
+          </c:val>
+        </c:ser>
+        <c:dLbls>
+          <c:showLegendKey val="0"/>
+          <c:showVal val="1"/>
+          <c:showCatName val="0"/>
+          <c:showSerName val="0"/>
+          <c:showPercent val="0"/>
+          <c:showBubbleSize val="0"/>
+        </c:dLbls>
+        <c:gapWidth val="150"/>
+        <c:axId val="-2092813784"/>
+        <c:axId val="-2092177368"/>
+      </c:barChart>
+      <c:catAx>
+        <c:axId val="-2092813784"/>
+        <c:scaling>
+          <c:orientation val="minMax"/>
+        </c:scaling>
+        <c:delete val="0"/>
+        <c:axPos val="l"/>
+        <c:majorTickMark val="out"/>
+        <c:minorTickMark val="none"/>
+        <c:tickLblPos val="nextTo"/>
+        <c:crossAx val="-2092177368"/>
+        <c:crosses val="autoZero"/>
+        <c:auto val="1"/>
+        <c:lblAlgn val="ctr"/>
+        <c:lblOffset val="100"/>
+        <c:noMultiLvlLbl val="0"/>
+      </c:catAx>
+      <c:valAx>
+        <c:axId val="-2092177368"/>
+        <c:scaling>
+          <c:orientation val="minMax"/>
+        </c:scaling>
+        <c:delete val="0"/>
+        <c:axPos val="b"/>
+        <c:majorGridlines/>
+        <c:numFmt formatCode="General" sourceLinked="1"/>
+        <c:majorTickMark val="out"/>
+        <c:minorTickMark val="none"/>
+        <c:tickLblPos val="nextTo"/>
+        <c:crossAx val="-2092813784"/>
         <c:crosses val="autoZero"/>
         <c:crossBetween val="between"/>
       </c:valAx>
@@ -816,6 +1063,58 @@
       </p:par>
     </p:tnLst>
   </p:timing>
+</p:sld>
+</file>
+
+<file path=ppt/slides/slide2.xml><?xml version="1.0" encoding="utf-8"?>
+<p:sld xmlns:a="http://schemas.openxmlformats.org/drawingml/2006/main" xmlns:r="http://schemas.openxmlformats.org/officeDocument/2006/relationships" xmlns:p="http://schemas.openxmlformats.org/presentationml/2006/main">
+  <p:cSld>
+    <p:spTree>
+      <p:nvGrpSpPr>
+        <p:cNvPr id="1" name=""/>
+        <p:cNvGrpSpPr/>
+        <p:nvPr/>
+      </p:nvGrpSpPr>
+      <p:grpSpPr>
+        <a:xfrm>
+          <a:off x="0" y="0"/>
+          <a:ext cx="0" cy="0"/>
+          <a:chOff x="0" y="0"/>
+          <a:chExt cx="0" cy="0"/>
+        </a:xfrm>
+      </p:grpSpPr>
+      <p:graphicFrame>
+        <p:nvGraphicFramePr>
+          <p:cNvPr id="2" name="Chart 1"/>
+          <p:cNvGraphicFramePr/>
+          <p:nvPr>
+            <p:extLst>
+              <p:ext uri="{D42A27DB-BD31-4B8C-83A1-F6EECF244321}">
+                <p14:modId xmlns:p14="http://schemas.microsoft.com/office/powerpoint/2010/main" val="750467582"/>
+              </p:ext>
+            </p:extLst>
+          </p:nvPr>
+        </p:nvGraphicFramePr>
+        <p:xfrm>
+          <a:off x="1524000" y="1397000"/>
+          <a:ext cx="6096000" cy="4064000"/>
+        </p:xfrm>
+        <a:graphic>
+          <a:graphicData uri="http://schemas.openxmlformats.org/drawingml/2006/chart">
+            <c:chart xmlns:c="http://schemas.openxmlformats.org/drawingml/2006/chart" xmlns:r="http://schemas.openxmlformats.org/officeDocument/2006/relationships" r:id="rId2"/>
+          </a:graphicData>
+        </a:graphic>
+      </p:graphicFrame>
+    </p:spTree>
+    <p:extLst>
+      <p:ext uri="{BB962C8B-B14F-4D97-AF65-F5344CB8AC3E}">
+        <p14:creationId xmlns:p14="http://schemas.microsoft.com/office/powerpoint/2010/main" val="119379614"/>
+      </p:ext>
+    </p:extLst>
+  </p:cSld>
+  <p:clrMapOvr>
+    <a:masterClrMapping/>
+  </p:clrMapOvr>
 </p:sld>
 </file>
 

</xml_diff>

<commit_message>
acpt: add scenarios for Xy/Bubble Series.points
</commit_message>
<xml_diff>
--- a/features/steps/test_files/cht-series-props.pptx
+++ b/features/steps/test_files/cht-series-props.pptx
@@ -7,6 +7,8 @@
   <p:sldIdLst>
     <p:sldId id="256" r:id="rId2"/>
     <p:sldId id="257" r:id="rId3"/>
+    <p:sldId id="258" r:id="rId4"/>
+    <p:sldId id="259" r:id="rId5"/>
   </p:sldIdLst>
   <p:sldSz cx="9144000" cy="6858000" type="screen4x3"/>
   <p:notesSz cx="6858000" cy="9144000"/>
@@ -394,11 +396,11 @@
           <c:showBubbleSize val="0"/>
         </c:dLbls>
         <c:gapWidth val="150"/>
-        <c:axId val="-2092787480"/>
-        <c:axId val="-2092782696"/>
+        <c:axId val="-2083610408"/>
+        <c:axId val="-2087929720"/>
       </c:barChart>
       <c:catAx>
-        <c:axId val="-2092787480"/>
+        <c:axId val="-2083610408"/>
         <c:scaling>
           <c:orientation val="minMax"/>
         </c:scaling>
@@ -407,7 +409,7 @@
         <c:majorTickMark val="out"/>
         <c:minorTickMark val="none"/>
         <c:tickLblPos val="nextTo"/>
-        <c:crossAx val="-2092782696"/>
+        <c:crossAx val="-2087929720"/>
         <c:crosses val="autoZero"/>
         <c:auto val="1"/>
         <c:lblAlgn val="ctr"/>
@@ -415,7 +417,7 @@
         <c:noMultiLvlLbl val="0"/>
       </c:catAx>
       <c:valAx>
-        <c:axId val="-2092782696"/>
+        <c:axId val="-2087929720"/>
         <c:scaling>
           <c:orientation val="minMax"/>
         </c:scaling>
@@ -426,7 +428,7 @@
         <c:majorTickMark val="out"/>
         <c:minorTickMark val="none"/>
         <c:tickLblPos val="nextTo"/>
-        <c:crossAx val="-2092787480"/>
+        <c:crossAx val="-2083610408"/>
         <c:crosses val="autoZero"/>
         <c:crossBetween val="between"/>
       </c:valAx>
@@ -639,11 +641,11 @@
           <c:showBubbleSize val="0"/>
         </c:dLbls>
         <c:gapWidth val="150"/>
-        <c:axId val="-2092813784"/>
-        <c:axId val="-2092177368"/>
+        <c:axId val="-2082902488"/>
+        <c:axId val="-2082683480"/>
       </c:barChart>
       <c:catAx>
-        <c:axId val="-2092813784"/>
+        <c:axId val="-2082902488"/>
         <c:scaling>
           <c:orientation val="minMax"/>
         </c:scaling>
@@ -652,7 +654,7 @@
         <c:majorTickMark val="out"/>
         <c:minorTickMark val="none"/>
         <c:tickLblPos val="nextTo"/>
-        <c:crossAx val="-2092177368"/>
+        <c:crossAx val="-2082683480"/>
         <c:crosses val="autoZero"/>
         <c:auto val="1"/>
         <c:lblAlgn val="ctr"/>
@@ -660,7 +662,7 @@
         <c:noMultiLvlLbl val="0"/>
       </c:catAx>
       <c:valAx>
-        <c:axId val="-2092177368"/>
+        <c:axId val="-2082683480"/>
         <c:scaling>
           <c:orientation val="minMax"/>
         </c:scaling>
@@ -671,9 +673,322 @@
         <c:majorTickMark val="out"/>
         <c:minorTickMark val="none"/>
         <c:tickLblPos val="nextTo"/>
-        <c:crossAx val="-2092813784"/>
+        <c:crossAx val="-2082902488"/>
         <c:crosses val="autoZero"/>
         <c:crossBetween val="between"/>
+      </c:valAx>
+    </c:plotArea>
+    <c:legend>
+      <c:legendPos val="r"/>
+      <c:layout/>
+      <c:overlay val="0"/>
+    </c:legend>
+    <c:plotVisOnly val="1"/>
+    <c:dispBlanksAs val="gap"/>
+    <c:showDLblsOverMax val="0"/>
+  </c:chart>
+  <c:txPr>
+    <a:bodyPr/>
+    <a:lstStyle/>
+    <a:p>
+      <a:pPr>
+        <a:defRPr sz="1800"/>
+      </a:pPr>
+      <a:endParaRPr lang="en-US"/>
+    </a:p>
+  </c:txPr>
+  <c:externalData r:id="rId1">
+    <c:autoUpdate val="0"/>
+  </c:externalData>
+</c:chartSpace>
+</file>
+
+<file path=ppt/charts/chart3.xml><?xml version="1.0" encoding="utf-8"?>
+<c:chartSpace xmlns:c="http://schemas.openxmlformats.org/drawingml/2006/chart" xmlns:a="http://schemas.openxmlformats.org/drawingml/2006/main" xmlns:r="http://schemas.openxmlformats.org/officeDocument/2006/relationships">
+  <c:date1904 val="0"/>
+  <c:lang val="en-US"/>
+  <c:roundedCorners val="0"/>
+  <mc:AlternateContent xmlns:mc="http://schemas.openxmlformats.org/markup-compatibility/2006">
+    <mc:Choice xmlns:c14="http://schemas.microsoft.com/office/drawing/2007/8/2/chart" Requires="c14">
+      <c14:style val="118"/>
+    </mc:Choice>
+    <mc:Fallback>
+      <c:style val="18"/>
+    </mc:Fallback>
+  </mc:AlternateContent>
+  <c:chart>
+    <c:title>
+      <c:layout/>
+      <c:overlay val="0"/>
+    </c:title>
+    <c:autoTitleDeleted val="0"/>
+    <c:plotArea>
+      <c:layout/>
+      <c:scatterChart>
+        <c:scatterStyle val="lineMarker"/>
+        <c:varyColors val="0"/>
+        <c:ser>
+          <c:idx val="0"/>
+          <c:order val="0"/>
+          <c:tx>
+            <c:strRef>
+              <c:f>Sheet1!$B$1</c:f>
+              <c:strCache>
+                <c:ptCount val="1"/>
+                <c:pt idx="0">
+                  <c:v>Y-Value 1</c:v>
+                </c:pt>
+              </c:strCache>
+            </c:strRef>
+          </c:tx>
+          <c:spPr>
+            <a:ln w="47625">
+              <a:noFill/>
+            </a:ln>
+          </c:spPr>
+          <c:xVal>
+            <c:numRef>
+              <c:f>Sheet1!$A$2:$A$4</c:f>
+              <c:numCache>
+                <c:formatCode>General</c:formatCode>
+                <c:ptCount val="3"/>
+                <c:pt idx="0">
+                  <c:v>0.7</c:v>
+                </c:pt>
+                <c:pt idx="1">
+                  <c:v>1.8</c:v>
+                </c:pt>
+                <c:pt idx="2">
+                  <c:v>2.6</c:v>
+                </c:pt>
+              </c:numCache>
+            </c:numRef>
+          </c:xVal>
+          <c:yVal>
+            <c:numRef>
+              <c:f>Sheet1!$B$2:$B$4</c:f>
+              <c:numCache>
+                <c:formatCode>General</c:formatCode>
+                <c:ptCount val="3"/>
+                <c:pt idx="0">
+                  <c:v>2.7</c:v>
+                </c:pt>
+                <c:pt idx="1">
+                  <c:v>3.2</c:v>
+                </c:pt>
+                <c:pt idx="2">
+                  <c:v>0.8</c:v>
+                </c:pt>
+              </c:numCache>
+            </c:numRef>
+          </c:yVal>
+          <c:smooth val="0"/>
+        </c:ser>
+        <c:dLbls>
+          <c:showLegendKey val="0"/>
+          <c:showVal val="0"/>
+          <c:showCatName val="0"/>
+          <c:showSerName val="0"/>
+          <c:showPercent val="0"/>
+          <c:showBubbleSize val="0"/>
+        </c:dLbls>
+        <c:axId val="-2081299672"/>
+        <c:axId val="-2081223496"/>
+      </c:scatterChart>
+      <c:valAx>
+        <c:axId val="-2081299672"/>
+        <c:scaling>
+          <c:orientation val="minMax"/>
+        </c:scaling>
+        <c:delete val="0"/>
+        <c:axPos val="b"/>
+        <c:numFmt formatCode="General" sourceLinked="1"/>
+        <c:majorTickMark val="out"/>
+        <c:minorTickMark val="none"/>
+        <c:tickLblPos val="nextTo"/>
+        <c:crossAx val="-2081223496"/>
+        <c:crosses val="autoZero"/>
+        <c:crossBetween val="midCat"/>
+      </c:valAx>
+      <c:valAx>
+        <c:axId val="-2081223496"/>
+        <c:scaling>
+          <c:orientation val="minMax"/>
+        </c:scaling>
+        <c:delete val="0"/>
+        <c:axPos val="l"/>
+        <c:majorGridlines/>
+        <c:numFmt formatCode="General" sourceLinked="1"/>
+        <c:majorTickMark val="out"/>
+        <c:minorTickMark val="none"/>
+        <c:tickLblPos val="nextTo"/>
+        <c:crossAx val="-2081299672"/>
+        <c:crosses val="autoZero"/>
+        <c:crossBetween val="midCat"/>
+      </c:valAx>
+    </c:plotArea>
+    <c:legend>
+      <c:legendPos val="r"/>
+      <c:layout/>
+      <c:overlay val="0"/>
+    </c:legend>
+    <c:plotVisOnly val="1"/>
+    <c:dispBlanksAs val="gap"/>
+    <c:showDLblsOverMax val="0"/>
+  </c:chart>
+  <c:txPr>
+    <a:bodyPr/>
+    <a:lstStyle/>
+    <a:p>
+      <a:pPr>
+        <a:defRPr sz="1800"/>
+      </a:pPr>
+      <a:endParaRPr lang="en-US"/>
+    </a:p>
+  </c:txPr>
+  <c:externalData r:id="rId1">
+    <c:autoUpdate val="0"/>
+  </c:externalData>
+</c:chartSpace>
+</file>
+
+<file path=ppt/charts/chart4.xml><?xml version="1.0" encoding="utf-8"?>
+<c:chartSpace xmlns:c="http://schemas.openxmlformats.org/drawingml/2006/chart" xmlns:a="http://schemas.openxmlformats.org/drawingml/2006/main" xmlns:r="http://schemas.openxmlformats.org/officeDocument/2006/relationships">
+  <c:date1904 val="0"/>
+  <c:lang val="en-US"/>
+  <c:roundedCorners val="0"/>
+  <mc:AlternateContent xmlns:mc="http://schemas.openxmlformats.org/markup-compatibility/2006">
+    <mc:Choice xmlns:c14="http://schemas.microsoft.com/office/drawing/2007/8/2/chart" Requires="c14">
+      <c14:style val="118"/>
+    </mc:Choice>
+    <mc:Fallback>
+      <c:style val="18"/>
+    </mc:Fallback>
+  </mc:AlternateContent>
+  <c:chart>
+    <c:title>
+      <c:layout/>
+      <c:overlay val="0"/>
+    </c:title>
+    <c:autoTitleDeleted val="0"/>
+    <c:plotArea>
+      <c:layout/>
+      <c:bubbleChart>
+        <c:varyColors val="0"/>
+        <c:ser>
+          <c:idx val="0"/>
+          <c:order val="0"/>
+          <c:tx>
+            <c:strRef>
+              <c:f>Sheet1!$B$1</c:f>
+              <c:strCache>
+                <c:ptCount val="1"/>
+                <c:pt idx="0">
+                  <c:v>Y-Value 1</c:v>
+                </c:pt>
+              </c:strCache>
+            </c:strRef>
+          </c:tx>
+          <c:invertIfNegative val="0"/>
+          <c:xVal>
+            <c:numRef>
+              <c:f>Sheet1!$A$2:$A$4</c:f>
+              <c:numCache>
+                <c:formatCode>General</c:formatCode>
+                <c:ptCount val="3"/>
+                <c:pt idx="0">
+                  <c:v>0.7</c:v>
+                </c:pt>
+                <c:pt idx="1">
+                  <c:v>1.8</c:v>
+                </c:pt>
+                <c:pt idx="2">
+                  <c:v>2.6</c:v>
+                </c:pt>
+              </c:numCache>
+            </c:numRef>
+          </c:xVal>
+          <c:yVal>
+            <c:numRef>
+              <c:f>Sheet1!$B$2:$B$4</c:f>
+              <c:numCache>
+                <c:formatCode>General</c:formatCode>
+                <c:ptCount val="3"/>
+                <c:pt idx="0">
+                  <c:v>2.7</c:v>
+                </c:pt>
+                <c:pt idx="1">
+                  <c:v>3.2</c:v>
+                </c:pt>
+                <c:pt idx="2">
+                  <c:v>0.8</c:v>
+                </c:pt>
+              </c:numCache>
+            </c:numRef>
+          </c:yVal>
+          <c:bubbleSize>
+            <c:numRef>
+              <c:f>Sheet1!$C$2:$C$4</c:f>
+              <c:numCache>
+                <c:formatCode>General</c:formatCode>
+                <c:ptCount val="3"/>
+                <c:pt idx="0">
+                  <c:v>10.0</c:v>
+                </c:pt>
+                <c:pt idx="1">
+                  <c:v>4.0</c:v>
+                </c:pt>
+                <c:pt idx="2">
+                  <c:v>8.0</c:v>
+                </c:pt>
+              </c:numCache>
+            </c:numRef>
+          </c:bubbleSize>
+          <c:bubble3D val="0"/>
+        </c:ser>
+        <c:dLbls>
+          <c:showLegendKey val="0"/>
+          <c:showVal val="0"/>
+          <c:showCatName val="0"/>
+          <c:showSerName val="0"/>
+          <c:showPercent val="0"/>
+          <c:showBubbleSize val="0"/>
+        </c:dLbls>
+        <c:bubbleScale val="100"/>
+        <c:showNegBubbles val="0"/>
+        <c:axId val="-2088715592"/>
+        <c:axId val="2140373832"/>
+      </c:bubbleChart>
+      <c:valAx>
+        <c:axId val="-2088715592"/>
+        <c:scaling>
+          <c:orientation val="minMax"/>
+        </c:scaling>
+        <c:delete val="0"/>
+        <c:axPos val="b"/>
+        <c:numFmt formatCode="General" sourceLinked="1"/>
+        <c:majorTickMark val="out"/>
+        <c:minorTickMark val="none"/>
+        <c:tickLblPos val="nextTo"/>
+        <c:crossAx val="2140373832"/>
+        <c:crosses val="autoZero"/>
+        <c:crossBetween val="midCat"/>
+      </c:valAx>
+      <c:valAx>
+        <c:axId val="2140373832"/>
+        <c:scaling>
+          <c:orientation val="minMax"/>
+        </c:scaling>
+        <c:delete val="0"/>
+        <c:axPos val="l"/>
+        <c:majorGridlines/>
+        <c:numFmt formatCode="General" sourceLinked="1"/>
+        <c:majorTickMark val="out"/>
+        <c:minorTickMark val="none"/>
+        <c:tickLblPos val="nextTo"/>
+        <c:crossAx val="-2088715592"/>
+        <c:crosses val="autoZero"/>
+        <c:crossBetween val="midCat"/>
       </c:valAx>
     </c:plotArea>
     <c:legend>
@@ -1109,6 +1424,110 @@
     <p:extLst>
       <p:ext uri="{BB962C8B-B14F-4D97-AF65-F5344CB8AC3E}">
         <p14:creationId xmlns:p14="http://schemas.microsoft.com/office/powerpoint/2010/main" val="119379614"/>
+      </p:ext>
+    </p:extLst>
+  </p:cSld>
+  <p:clrMapOvr>
+    <a:masterClrMapping/>
+  </p:clrMapOvr>
+</p:sld>
+</file>
+
+<file path=ppt/slides/slide3.xml><?xml version="1.0" encoding="utf-8"?>
+<p:sld xmlns:a="http://schemas.openxmlformats.org/drawingml/2006/main" xmlns:r="http://schemas.openxmlformats.org/officeDocument/2006/relationships" xmlns:p="http://schemas.openxmlformats.org/presentationml/2006/main">
+  <p:cSld>
+    <p:spTree>
+      <p:nvGrpSpPr>
+        <p:cNvPr id="1" name=""/>
+        <p:cNvGrpSpPr/>
+        <p:nvPr/>
+      </p:nvGrpSpPr>
+      <p:grpSpPr>
+        <a:xfrm>
+          <a:off x="0" y="0"/>
+          <a:ext cx="0" cy="0"/>
+          <a:chOff x="0" y="0"/>
+          <a:chExt cx="0" cy="0"/>
+        </a:xfrm>
+      </p:grpSpPr>
+      <p:graphicFrame>
+        <p:nvGraphicFramePr>
+          <p:cNvPr id="2" name="Chart 1"/>
+          <p:cNvGraphicFramePr/>
+          <p:nvPr>
+            <p:extLst>
+              <p:ext uri="{D42A27DB-BD31-4B8C-83A1-F6EECF244321}">
+                <p14:modId xmlns:p14="http://schemas.microsoft.com/office/powerpoint/2010/main" val="9365463"/>
+              </p:ext>
+            </p:extLst>
+          </p:nvPr>
+        </p:nvGraphicFramePr>
+        <p:xfrm>
+          <a:off x="1524000" y="1397000"/>
+          <a:ext cx="6096000" cy="4064000"/>
+        </p:xfrm>
+        <a:graphic>
+          <a:graphicData uri="http://schemas.openxmlformats.org/drawingml/2006/chart">
+            <c:chart xmlns:c="http://schemas.openxmlformats.org/drawingml/2006/chart" xmlns:r="http://schemas.openxmlformats.org/officeDocument/2006/relationships" r:id="rId2"/>
+          </a:graphicData>
+        </a:graphic>
+      </p:graphicFrame>
+    </p:spTree>
+    <p:extLst>
+      <p:ext uri="{BB962C8B-B14F-4D97-AF65-F5344CB8AC3E}">
+        <p14:creationId xmlns:p14="http://schemas.microsoft.com/office/powerpoint/2010/main" val="2355932787"/>
+      </p:ext>
+    </p:extLst>
+  </p:cSld>
+  <p:clrMapOvr>
+    <a:masterClrMapping/>
+  </p:clrMapOvr>
+</p:sld>
+</file>
+
+<file path=ppt/slides/slide4.xml><?xml version="1.0" encoding="utf-8"?>
+<p:sld xmlns:a="http://schemas.openxmlformats.org/drawingml/2006/main" xmlns:r="http://schemas.openxmlformats.org/officeDocument/2006/relationships" xmlns:p="http://schemas.openxmlformats.org/presentationml/2006/main">
+  <p:cSld>
+    <p:spTree>
+      <p:nvGrpSpPr>
+        <p:cNvPr id="1" name=""/>
+        <p:cNvGrpSpPr/>
+        <p:nvPr/>
+      </p:nvGrpSpPr>
+      <p:grpSpPr>
+        <a:xfrm>
+          <a:off x="0" y="0"/>
+          <a:ext cx="0" cy="0"/>
+          <a:chOff x="0" y="0"/>
+          <a:chExt cx="0" cy="0"/>
+        </a:xfrm>
+      </p:grpSpPr>
+      <p:graphicFrame>
+        <p:nvGraphicFramePr>
+          <p:cNvPr id="2" name="Chart 1"/>
+          <p:cNvGraphicFramePr/>
+          <p:nvPr>
+            <p:extLst>
+              <p:ext uri="{D42A27DB-BD31-4B8C-83A1-F6EECF244321}">
+                <p14:modId xmlns:p14="http://schemas.microsoft.com/office/powerpoint/2010/main" val="3661347850"/>
+              </p:ext>
+            </p:extLst>
+          </p:nvPr>
+        </p:nvGraphicFramePr>
+        <p:xfrm>
+          <a:off x="1524000" y="1397000"/>
+          <a:ext cx="6096000" cy="4064000"/>
+        </p:xfrm>
+        <a:graphic>
+          <a:graphicData uri="http://schemas.openxmlformats.org/drawingml/2006/chart">
+            <c:chart xmlns:c="http://schemas.openxmlformats.org/drawingml/2006/chart" xmlns:r="http://schemas.openxmlformats.org/officeDocument/2006/relationships" r:id="rId2"/>
+          </a:graphicData>
+        </a:graphic>
+      </p:graphicFrame>
+    </p:spTree>
+    <p:extLst>
+      <p:ext uri="{BB962C8B-B14F-4D97-AF65-F5344CB8AC3E}">
+        <p14:creationId xmlns:p14="http://schemas.microsoft.com/office/powerpoint/2010/main" val="1759867189"/>
       </p:ext>
     </p:extLst>
   </p:cSld>

</xml_diff>

<commit_message>
acpt: add scenario for empty series value
</commit_message>
<xml_diff>
--- a/features/steps/test_files/cht-series-props.pptx
+++ b/features/steps/test_files/cht-series-props.pptx
@@ -396,11 +396,11 @@
           <c:showBubbleSize val="0"/>
         </c:dLbls>
         <c:gapWidth val="150"/>
-        <c:axId val="-2083610408"/>
-        <c:axId val="-2087929720"/>
+        <c:axId val="-2115084968"/>
+        <c:axId val="-2115081848"/>
       </c:barChart>
       <c:catAx>
-        <c:axId val="-2083610408"/>
+        <c:axId val="-2115084968"/>
         <c:scaling>
           <c:orientation val="minMax"/>
         </c:scaling>
@@ -409,7 +409,7 @@
         <c:majorTickMark val="out"/>
         <c:minorTickMark val="none"/>
         <c:tickLblPos val="nextTo"/>
-        <c:crossAx val="-2087929720"/>
+        <c:crossAx val="-2115081848"/>
         <c:crosses val="autoZero"/>
         <c:auto val="1"/>
         <c:lblAlgn val="ctr"/>
@@ -417,7 +417,7 @@
         <c:noMultiLvlLbl val="0"/>
       </c:catAx>
       <c:valAx>
-        <c:axId val="-2087929720"/>
+        <c:axId val="-2115081848"/>
         <c:scaling>
           <c:orientation val="minMax"/>
         </c:scaling>
@@ -428,7 +428,7 @@
         <c:majorTickMark val="out"/>
         <c:minorTickMark val="none"/>
         <c:tickLblPos val="nextTo"/>
-        <c:crossAx val="-2083610408"/>
+        <c:crossAx val="-2115084968"/>
         <c:crosses val="autoZero"/>
         <c:crossBetween val="between"/>
       </c:valAx>
@@ -571,9 +571,6 @@
                 <c:pt idx="0">
                   <c:v>4.5</c:v>
                 </c:pt>
-                <c:pt idx="1">
-                  <c:v>5.6</c:v>
-                </c:pt>
                 <c:pt idx="2">
                   <c:v>6.7</c:v>
                 </c:pt>
@@ -641,11 +638,11 @@
           <c:showBubbleSize val="0"/>
         </c:dLbls>
         <c:gapWidth val="150"/>
-        <c:axId val="-2082902488"/>
-        <c:axId val="-2082683480"/>
+        <c:axId val="-2117169288"/>
+        <c:axId val="-2117166232"/>
       </c:barChart>
       <c:catAx>
-        <c:axId val="-2082902488"/>
+        <c:axId val="-2117169288"/>
         <c:scaling>
           <c:orientation val="minMax"/>
         </c:scaling>
@@ -654,7 +651,7 @@
         <c:majorTickMark val="out"/>
         <c:minorTickMark val="none"/>
         <c:tickLblPos val="nextTo"/>
-        <c:crossAx val="-2082683480"/>
+        <c:crossAx val="-2117166232"/>
         <c:crosses val="autoZero"/>
         <c:auto val="1"/>
         <c:lblAlgn val="ctr"/>
@@ -662,7 +659,7 @@
         <c:noMultiLvlLbl val="0"/>
       </c:catAx>
       <c:valAx>
-        <c:axId val="-2082683480"/>
+        <c:axId val="-2117166232"/>
         <c:scaling>
           <c:orientation val="minMax"/>
         </c:scaling>
@@ -673,7 +670,7 @@
         <c:majorTickMark val="out"/>
         <c:minorTickMark val="none"/>
         <c:tickLblPos val="nextTo"/>
-        <c:crossAx val="-2082902488"/>
+        <c:crossAx val="-2117169288"/>
         <c:crosses val="autoZero"/>
         <c:crossBetween val="between"/>
       </c:valAx>
@@ -792,11 +789,11 @@
           <c:showPercent val="0"/>
           <c:showBubbleSize val="0"/>
         </c:dLbls>
-        <c:axId val="-2081299672"/>
-        <c:axId val="-2081223496"/>
+        <c:axId val="-2117138168"/>
+        <c:axId val="-2117135144"/>
       </c:scatterChart>
       <c:valAx>
-        <c:axId val="-2081299672"/>
+        <c:axId val="-2117138168"/>
         <c:scaling>
           <c:orientation val="minMax"/>
         </c:scaling>
@@ -806,12 +803,12 @@
         <c:majorTickMark val="out"/>
         <c:minorTickMark val="none"/>
         <c:tickLblPos val="nextTo"/>
-        <c:crossAx val="-2081223496"/>
+        <c:crossAx val="-2117135144"/>
         <c:crosses val="autoZero"/>
         <c:crossBetween val="midCat"/>
       </c:valAx>
       <c:valAx>
-        <c:axId val="-2081223496"/>
+        <c:axId val="-2117135144"/>
         <c:scaling>
           <c:orientation val="minMax"/>
         </c:scaling>
@@ -822,7 +819,7 @@
         <c:majorTickMark val="out"/>
         <c:minorTickMark val="none"/>
         <c:tickLblPos val="nextTo"/>
-        <c:crossAx val="-2081299672"/>
+        <c:crossAx val="-2117138168"/>
         <c:crosses val="autoZero"/>
         <c:crossBetween val="midCat"/>
       </c:valAx>
@@ -956,11 +953,11 @@
         </c:dLbls>
         <c:bubbleScale val="100"/>
         <c:showNegBubbles val="0"/>
-        <c:axId val="-2088715592"/>
-        <c:axId val="2140373832"/>
+        <c:axId val="-2113702712"/>
+        <c:axId val="-2113699688"/>
       </c:bubbleChart>
       <c:valAx>
-        <c:axId val="-2088715592"/>
+        <c:axId val="-2113702712"/>
         <c:scaling>
           <c:orientation val="minMax"/>
         </c:scaling>
@@ -970,12 +967,12 @@
         <c:majorTickMark val="out"/>
         <c:minorTickMark val="none"/>
         <c:tickLblPos val="nextTo"/>
-        <c:crossAx val="2140373832"/>
+        <c:crossAx val="-2113699688"/>
         <c:crosses val="autoZero"/>
         <c:crossBetween val="midCat"/>
       </c:valAx>
       <c:valAx>
-        <c:axId val="2140373832"/>
+        <c:axId val="-2113699688"/>
         <c:scaling>
           <c:orientation val="minMax"/>
         </c:scaling>
@@ -986,7 +983,7 @@
         <c:majorTickMark val="out"/>
         <c:minorTickMark val="none"/>
         <c:tickLblPos val="nextTo"/>
-        <c:crossAx val="-2088715592"/>
+        <c:crossAx val="-2113702712"/>
         <c:crosses val="autoZero"/>
         <c:crossBetween val="midCat"/>
       </c:valAx>
@@ -1405,7 +1402,7 @@
           <p:nvPr>
             <p:extLst>
               <p:ext uri="{D42A27DB-BD31-4B8C-83A1-F6EECF244321}">
-                <p14:modId xmlns:p14="http://schemas.microsoft.com/office/powerpoint/2010/main" val="750467582"/>
+                <p14:modId xmlns:p14="http://schemas.microsoft.com/office/powerpoint/2010/main" val="553202573"/>
               </p:ext>
             </p:extLst>
           </p:nvPr>

</xml_diff>

<commit_message>
acpt: add scenarios for Series.marker
</commit_message>
<xml_diff>
--- a/features/steps/test_files/cht-series-props.pptx
+++ b/features/steps/test_files/cht-series-props.pptx
@@ -9,6 +9,8 @@
     <p:sldId id="257" r:id="rId3"/>
     <p:sldId id="258" r:id="rId4"/>
     <p:sldId id="259" r:id="rId5"/>
+    <p:sldId id="260" r:id="rId6"/>
+    <p:sldId id="261" r:id="rId7"/>
   </p:sldIdLst>
   <p:sldSz cx="9144000" cy="6858000" type="screen4x3"/>
   <p:notesSz cx="6858000" cy="9144000"/>
@@ -396,11 +398,11 @@
           <c:showBubbleSize val="0"/>
         </c:dLbls>
         <c:gapWidth val="150"/>
-        <c:axId val="-2115084968"/>
-        <c:axId val="-2115081848"/>
+        <c:axId val="-2147055240"/>
+        <c:axId val="-2147052120"/>
       </c:barChart>
       <c:catAx>
-        <c:axId val="-2115084968"/>
+        <c:axId val="-2147055240"/>
         <c:scaling>
           <c:orientation val="minMax"/>
         </c:scaling>
@@ -409,7 +411,7 @@
         <c:majorTickMark val="out"/>
         <c:minorTickMark val="none"/>
         <c:tickLblPos val="nextTo"/>
-        <c:crossAx val="-2115081848"/>
+        <c:crossAx val="-2147052120"/>
         <c:crosses val="autoZero"/>
         <c:auto val="1"/>
         <c:lblAlgn val="ctr"/>
@@ -417,7 +419,7 @@
         <c:noMultiLvlLbl val="0"/>
       </c:catAx>
       <c:valAx>
-        <c:axId val="-2115081848"/>
+        <c:axId val="-2147052120"/>
         <c:scaling>
           <c:orientation val="minMax"/>
         </c:scaling>
@@ -428,7 +430,7 @@
         <c:majorTickMark val="out"/>
         <c:minorTickMark val="none"/>
         <c:tickLblPos val="nextTo"/>
-        <c:crossAx val="-2115084968"/>
+        <c:crossAx val="-2147055240"/>
         <c:crosses val="autoZero"/>
         <c:crossBetween val="between"/>
       </c:valAx>
@@ -638,11 +640,11 @@
           <c:showBubbleSize val="0"/>
         </c:dLbls>
         <c:gapWidth val="150"/>
-        <c:axId val="-2117169288"/>
-        <c:axId val="-2117166232"/>
+        <c:axId val="-2147310392"/>
+        <c:axId val="-2147307288"/>
       </c:barChart>
       <c:catAx>
-        <c:axId val="-2117169288"/>
+        <c:axId val="-2147310392"/>
         <c:scaling>
           <c:orientation val="minMax"/>
         </c:scaling>
@@ -651,7 +653,7 @@
         <c:majorTickMark val="out"/>
         <c:minorTickMark val="none"/>
         <c:tickLblPos val="nextTo"/>
-        <c:crossAx val="-2117166232"/>
+        <c:crossAx val="-2147307288"/>
         <c:crosses val="autoZero"/>
         <c:auto val="1"/>
         <c:lblAlgn val="ctr"/>
@@ -659,7 +661,7 @@
         <c:noMultiLvlLbl val="0"/>
       </c:catAx>
       <c:valAx>
-        <c:axId val="-2117166232"/>
+        <c:axId val="-2147307288"/>
         <c:scaling>
           <c:orientation val="minMax"/>
         </c:scaling>
@@ -670,7 +672,7 @@
         <c:majorTickMark val="out"/>
         <c:minorTickMark val="none"/>
         <c:tickLblPos val="nextTo"/>
-        <c:crossAx val="-2117169288"/>
+        <c:crossAx val="-2147310392"/>
         <c:crosses val="autoZero"/>
         <c:crossBetween val="between"/>
       </c:valAx>
@@ -789,11 +791,11 @@
           <c:showPercent val="0"/>
           <c:showBubbleSize val="0"/>
         </c:dLbls>
-        <c:axId val="-2117138168"/>
-        <c:axId val="-2117135144"/>
+        <c:axId val="-2147258344"/>
+        <c:axId val="-2147255384"/>
       </c:scatterChart>
       <c:valAx>
-        <c:axId val="-2117138168"/>
+        <c:axId val="-2147258344"/>
         <c:scaling>
           <c:orientation val="minMax"/>
         </c:scaling>
@@ -803,12 +805,12 @@
         <c:majorTickMark val="out"/>
         <c:minorTickMark val="none"/>
         <c:tickLblPos val="nextTo"/>
-        <c:crossAx val="-2117135144"/>
+        <c:crossAx val="-2147255384"/>
         <c:crosses val="autoZero"/>
         <c:crossBetween val="midCat"/>
       </c:valAx>
       <c:valAx>
-        <c:axId val="-2117135144"/>
+        <c:axId val="-2147255384"/>
         <c:scaling>
           <c:orientation val="minMax"/>
         </c:scaling>
@@ -819,7 +821,7 @@
         <c:majorTickMark val="out"/>
         <c:minorTickMark val="none"/>
         <c:tickLblPos val="nextTo"/>
-        <c:crossAx val="-2117138168"/>
+        <c:crossAx val="-2147258344"/>
         <c:crosses val="autoZero"/>
         <c:crossBetween val="midCat"/>
       </c:valAx>
@@ -953,11 +955,11 @@
         </c:dLbls>
         <c:bubbleScale val="100"/>
         <c:showNegBubbles val="0"/>
-        <c:axId val="-2113702712"/>
-        <c:axId val="-2113699688"/>
+        <c:axId val="-2146463848"/>
+        <c:axId val="-2146460888"/>
       </c:bubbleChart>
       <c:valAx>
-        <c:axId val="-2113702712"/>
+        <c:axId val="-2146463848"/>
         <c:scaling>
           <c:orientation val="minMax"/>
         </c:scaling>
@@ -967,12 +969,12 @@
         <c:majorTickMark val="out"/>
         <c:minorTickMark val="none"/>
         <c:tickLblPos val="nextTo"/>
-        <c:crossAx val="-2113699688"/>
+        <c:crossAx val="-2146460888"/>
         <c:crosses val="autoZero"/>
         <c:crossBetween val="midCat"/>
       </c:valAx>
       <c:valAx>
-        <c:axId val="-2113699688"/>
+        <c:axId val="-2146460888"/>
         <c:scaling>
           <c:orientation val="minMax"/>
         </c:scaling>
@@ -983,9 +985,490 @@
         <c:majorTickMark val="out"/>
         <c:minorTickMark val="none"/>
         <c:tickLblPos val="nextTo"/>
-        <c:crossAx val="-2113702712"/>
+        <c:crossAx val="-2146463848"/>
         <c:crosses val="autoZero"/>
         <c:crossBetween val="midCat"/>
+      </c:valAx>
+    </c:plotArea>
+    <c:legend>
+      <c:legendPos val="r"/>
+      <c:layout/>
+      <c:overlay val="0"/>
+    </c:legend>
+    <c:plotVisOnly val="1"/>
+    <c:dispBlanksAs val="gap"/>
+    <c:showDLblsOverMax val="0"/>
+  </c:chart>
+  <c:txPr>
+    <a:bodyPr/>
+    <a:lstStyle/>
+    <a:p>
+      <a:pPr>
+        <a:defRPr sz="1800"/>
+      </a:pPr>
+      <a:endParaRPr lang="en-US"/>
+    </a:p>
+  </c:txPr>
+  <c:externalData r:id="rId1">
+    <c:autoUpdate val="0"/>
+  </c:externalData>
+</c:chartSpace>
+</file>
+
+<file path=ppt/charts/chart5.xml><?xml version="1.0" encoding="utf-8"?>
+<c:chartSpace xmlns:c="http://schemas.openxmlformats.org/drawingml/2006/chart" xmlns:a="http://schemas.openxmlformats.org/drawingml/2006/main" xmlns:r="http://schemas.openxmlformats.org/officeDocument/2006/relationships">
+  <c:date1904 val="0"/>
+  <c:lang val="en-US"/>
+  <c:roundedCorners val="0"/>
+  <mc:AlternateContent xmlns:mc="http://schemas.openxmlformats.org/markup-compatibility/2006">
+    <mc:Choice xmlns:c14="http://schemas.microsoft.com/office/drawing/2007/8/2/chart" Requires="c14">
+      <c14:style val="118"/>
+    </mc:Choice>
+    <mc:Fallback>
+      <c:style val="18"/>
+    </mc:Fallback>
+  </mc:AlternateContent>
+  <c:chart>
+    <c:autoTitleDeleted val="0"/>
+    <c:plotArea>
+      <c:layout/>
+      <c:lineChart>
+        <c:grouping val="standard"/>
+        <c:varyColors val="0"/>
+        <c:ser>
+          <c:idx val="0"/>
+          <c:order val="0"/>
+          <c:tx>
+            <c:strRef>
+              <c:f>Sheet1!$B$1</c:f>
+              <c:strCache>
+                <c:ptCount val="1"/>
+                <c:pt idx="0">
+                  <c:v>Series 1</c:v>
+                </c:pt>
+              </c:strCache>
+            </c:strRef>
+          </c:tx>
+          <c:cat>
+            <c:strRef>
+              <c:f>Sheet1!$A$2:$A$5</c:f>
+              <c:strCache>
+                <c:ptCount val="4"/>
+                <c:pt idx="0">
+                  <c:v>Category 1</c:v>
+                </c:pt>
+                <c:pt idx="1">
+                  <c:v>Category 2</c:v>
+                </c:pt>
+                <c:pt idx="2">
+                  <c:v>Category 3</c:v>
+                </c:pt>
+                <c:pt idx="3">
+                  <c:v>Category 4</c:v>
+                </c:pt>
+              </c:strCache>
+            </c:strRef>
+          </c:cat>
+          <c:val>
+            <c:numRef>
+              <c:f>Sheet1!$B$2:$B$5</c:f>
+              <c:numCache>
+                <c:formatCode>General</c:formatCode>
+                <c:ptCount val="4"/>
+                <c:pt idx="0">
+                  <c:v>4.3</c:v>
+                </c:pt>
+                <c:pt idx="1">
+                  <c:v>2.5</c:v>
+                </c:pt>
+                <c:pt idx="2">
+                  <c:v>3.5</c:v>
+                </c:pt>
+                <c:pt idx="3">
+                  <c:v>4.5</c:v>
+                </c:pt>
+              </c:numCache>
+            </c:numRef>
+          </c:val>
+          <c:smooth val="0"/>
+        </c:ser>
+        <c:ser>
+          <c:idx val="1"/>
+          <c:order val="1"/>
+          <c:tx>
+            <c:strRef>
+              <c:f>Sheet1!$C$1</c:f>
+              <c:strCache>
+                <c:ptCount val="1"/>
+                <c:pt idx="0">
+                  <c:v>Series 2</c:v>
+                </c:pt>
+              </c:strCache>
+            </c:strRef>
+          </c:tx>
+          <c:cat>
+            <c:strRef>
+              <c:f>Sheet1!$A$2:$A$5</c:f>
+              <c:strCache>
+                <c:ptCount val="4"/>
+                <c:pt idx="0">
+                  <c:v>Category 1</c:v>
+                </c:pt>
+                <c:pt idx="1">
+                  <c:v>Category 2</c:v>
+                </c:pt>
+                <c:pt idx="2">
+                  <c:v>Category 3</c:v>
+                </c:pt>
+                <c:pt idx="3">
+                  <c:v>Category 4</c:v>
+                </c:pt>
+              </c:strCache>
+            </c:strRef>
+          </c:cat>
+          <c:val>
+            <c:numRef>
+              <c:f>Sheet1!$C$2:$C$5</c:f>
+              <c:numCache>
+                <c:formatCode>General</c:formatCode>
+                <c:ptCount val="4"/>
+                <c:pt idx="0">
+                  <c:v>2.4</c:v>
+                </c:pt>
+                <c:pt idx="1">
+                  <c:v>4.4</c:v>
+                </c:pt>
+                <c:pt idx="2">
+                  <c:v>1.8</c:v>
+                </c:pt>
+                <c:pt idx="3">
+                  <c:v>2.8</c:v>
+                </c:pt>
+              </c:numCache>
+            </c:numRef>
+          </c:val>
+          <c:smooth val="0"/>
+        </c:ser>
+        <c:ser>
+          <c:idx val="2"/>
+          <c:order val="2"/>
+          <c:tx>
+            <c:strRef>
+              <c:f>Sheet1!$D$1</c:f>
+              <c:strCache>
+                <c:ptCount val="1"/>
+                <c:pt idx="0">
+                  <c:v>Series 3</c:v>
+                </c:pt>
+              </c:strCache>
+            </c:strRef>
+          </c:tx>
+          <c:cat>
+            <c:strRef>
+              <c:f>Sheet1!$A$2:$A$5</c:f>
+              <c:strCache>
+                <c:ptCount val="4"/>
+                <c:pt idx="0">
+                  <c:v>Category 1</c:v>
+                </c:pt>
+                <c:pt idx="1">
+                  <c:v>Category 2</c:v>
+                </c:pt>
+                <c:pt idx="2">
+                  <c:v>Category 3</c:v>
+                </c:pt>
+                <c:pt idx="3">
+                  <c:v>Category 4</c:v>
+                </c:pt>
+              </c:strCache>
+            </c:strRef>
+          </c:cat>
+          <c:val>
+            <c:numRef>
+              <c:f>Sheet1!$D$2:$D$5</c:f>
+              <c:numCache>
+                <c:formatCode>General</c:formatCode>
+                <c:ptCount val="4"/>
+                <c:pt idx="0">
+                  <c:v>2.0</c:v>
+                </c:pt>
+                <c:pt idx="1">
+                  <c:v>2.0</c:v>
+                </c:pt>
+                <c:pt idx="2">
+                  <c:v>3.0</c:v>
+                </c:pt>
+                <c:pt idx="3">
+                  <c:v>5.0</c:v>
+                </c:pt>
+              </c:numCache>
+            </c:numRef>
+          </c:val>
+          <c:smooth val="0"/>
+        </c:ser>
+        <c:dLbls>
+          <c:showLegendKey val="0"/>
+          <c:showVal val="0"/>
+          <c:showCatName val="0"/>
+          <c:showSerName val="0"/>
+          <c:showPercent val="0"/>
+          <c:showBubbleSize val="0"/>
+        </c:dLbls>
+        <c:marker val="1"/>
+        <c:smooth val="0"/>
+        <c:axId val="2072272232"/>
+        <c:axId val="2072264040"/>
+      </c:lineChart>
+      <c:catAx>
+        <c:axId val="2072272232"/>
+        <c:scaling>
+          <c:orientation val="minMax"/>
+        </c:scaling>
+        <c:delete val="0"/>
+        <c:axPos val="b"/>
+        <c:majorTickMark val="out"/>
+        <c:minorTickMark val="none"/>
+        <c:tickLblPos val="nextTo"/>
+        <c:crossAx val="2072264040"/>
+        <c:crosses val="autoZero"/>
+        <c:auto val="1"/>
+        <c:lblAlgn val="ctr"/>
+        <c:lblOffset val="100"/>
+        <c:noMultiLvlLbl val="0"/>
+      </c:catAx>
+      <c:valAx>
+        <c:axId val="2072264040"/>
+        <c:scaling>
+          <c:orientation val="minMax"/>
+        </c:scaling>
+        <c:delete val="0"/>
+        <c:axPos val="l"/>
+        <c:majorGridlines/>
+        <c:numFmt formatCode="General" sourceLinked="1"/>
+        <c:majorTickMark val="out"/>
+        <c:minorTickMark val="none"/>
+        <c:tickLblPos val="nextTo"/>
+        <c:crossAx val="2072272232"/>
+        <c:crosses val="autoZero"/>
+        <c:crossBetween val="between"/>
+      </c:valAx>
+    </c:plotArea>
+    <c:legend>
+      <c:legendPos val="r"/>
+      <c:layout/>
+      <c:overlay val="0"/>
+    </c:legend>
+    <c:plotVisOnly val="1"/>
+    <c:dispBlanksAs val="gap"/>
+    <c:showDLblsOverMax val="0"/>
+  </c:chart>
+  <c:txPr>
+    <a:bodyPr/>
+    <a:lstStyle/>
+    <a:p>
+      <a:pPr>
+        <a:defRPr sz="1800"/>
+      </a:pPr>
+      <a:endParaRPr lang="en-US"/>
+    </a:p>
+  </c:txPr>
+  <c:externalData r:id="rId1">
+    <c:autoUpdate val="0"/>
+  </c:externalData>
+</c:chartSpace>
+</file>
+
+<file path=ppt/charts/chart6.xml><?xml version="1.0" encoding="utf-8"?>
+<c:chartSpace xmlns:c="http://schemas.openxmlformats.org/drawingml/2006/chart" xmlns:a="http://schemas.openxmlformats.org/drawingml/2006/main" xmlns:r="http://schemas.openxmlformats.org/officeDocument/2006/relationships">
+  <c:date1904 val="0"/>
+  <c:lang val="en-US"/>
+  <c:roundedCorners val="0"/>
+  <mc:AlternateContent xmlns:mc="http://schemas.openxmlformats.org/markup-compatibility/2006">
+    <mc:Choice xmlns:c14="http://schemas.microsoft.com/office/drawing/2007/8/2/chart" Requires="c14">
+      <c14:style val="118"/>
+    </mc:Choice>
+    <mc:Fallback>
+      <c:style val="18"/>
+    </mc:Fallback>
+  </mc:AlternateContent>
+  <c:chart>
+    <c:autoTitleDeleted val="0"/>
+    <c:plotArea>
+      <c:layout/>
+      <c:radarChart>
+        <c:radarStyle val="marker"/>
+        <c:varyColors val="0"/>
+        <c:ser>
+          <c:idx val="0"/>
+          <c:order val="0"/>
+          <c:tx>
+            <c:strRef>
+              <c:f>Sheet1!$B$1</c:f>
+              <c:strCache>
+                <c:ptCount val="1"/>
+                <c:pt idx="0">
+                  <c:v>Series 1</c:v>
+                </c:pt>
+              </c:strCache>
+            </c:strRef>
+          </c:tx>
+          <c:cat>
+            <c:numRef>
+              <c:f>Sheet1!$A$2:$A$6</c:f>
+              <c:numCache>
+                <c:formatCode>m/d/yy</c:formatCode>
+                <c:ptCount val="5"/>
+                <c:pt idx="0">
+                  <c:v>37261.0</c:v>
+                </c:pt>
+                <c:pt idx="1">
+                  <c:v>37262.0</c:v>
+                </c:pt>
+                <c:pt idx="2">
+                  <c:v>37263.0</c:v>
+                </c:pt>
+                <c:pt idx="3">
+                  <c:v>37264.0</c:v>
+                </c:pt>
+                <c:pt idx="4">
+                  <c:v>37265.0</c:v>
+                </c:pt>
+              </c:numCache>
+            </c:numRef>
+          </c:cat>
+          <c:val>
+            <c:numRef>
+              <c:f>Sheet1!$B$2:$B$6</c:f>
+              <c:numCache>
+                <c:formatCode>General</c:formatCode>
+                <c:ptCount val="5"/>
+                <c:pt idx="0">
+                  <c:v>32.0</c:v>
+                </c:pt>
+                <c:pt idx="1">
+                  <c:v>32.0</c:v>
+                </c:pt>
+                <c:pt idx="2">
+                  <c:v>28.0</c:v>
+                </c:pt>
+                <c:pt idx="3">
+                  <c:v>12.0</c:v>
+                </c:pt>
+                <c:pt idx="4">
+                  <c:v>15.0</c:v>
+                </c:pt>
+              </c:numCache>
+            </c:numRef>
+          </c:val>
+        </c:ser>
+        <c:ser>
+          <c:idx val="1"/>
+          <c:order val="1"/>
+          <c:tx>
+            <c:strRef>
+              <c:f>Sheet1!$C$1</c:f>
+              <c:strCache>
+                <c:ptCount val="1"/>
+                <c:pt idx="0">
+                  <c:v>Series 2</c:v>
+                </c:pt>
+              </c:strCache>
+            </c:strRef>
+          </c:tx>
+          <c:cat>
+            <c:numRef>
+              <c:f>Sheet1!$A$2:$A$6</c:f>
+              <c:numCache>
+                <c:formatCode>m/d/yy</c:formatCode>
+                <c:ptCount val="5"/>
+                <c:pt idx="0">
+                  <c:v>37261.0</c:v>
+                </c:pt>
+                <c:pt idx="1">
+                  <c:v>37262.0</c:v>
+                </c:pt>
+                <c:pt idx="2">
+                  <c:v>37263.0</c:v>
+                </c:pt>
+                <c:pt idx="3">
+                  <c:v>37264.0</c:v>
+                </c:pt>
+                <c:pt idx="4">
+                  <c:v>37265.0</c:v>
+                </c:pt>
+              </c:numCache>
+            </c:numRef>
+          </c:cat>
+          <c:val>
+            <c:numRef>
+              <c:f>Sheet1!$C$2:$C$6</c:f>
+              <c:numCache>
+                <c:formatCode>General</c:formatCode>
+                <c:ptCount val="5"/>
+                <c:pt idx="0">
+                  <c:v>12.0</c:v>
+                </c:pt>
+                <c:pt idx="1">
+                  <c:v>12.0</c:v>
+                </c:pt>
+                <c:pt idx="2">
+                  <c:v>12.0</c:v>
+                </c:pt>
+                <c:pt idx="3">
+                  <c:v>21.0</c:v>
+                </c:pt>
+                <c:pt idx="4">
+                  <c:v>28.0</c:v>
+                </c:pt>
+              </c:numCache>
+            </c:numRef>
+          </c:val>
+        </c:ser>
+        <c:dLbls>
+          <c:showLegendKey val="0"/>
+          <c:showVal val="0"/>
+          <c:showCatName val="0"/>
+          <c:showSerName val="0"/>
+          <c:showPercent val="0"/>
+          <c:showBubbleSize val="0"/>
+        </c:dLbls>
+        <c:axId val="2061718200"/>
+        <c:axId val="-2111474888"/>
+      </c:radarChart>
+      <c:catAx>
+        <c:axId val="2061718200"/>
+        <c:scaling>
+          <c:orientation val="minMax"/>
+        </c:scaling>
+        <c:delete val="0"/>
+        <c:axPos val="b"/>
+        <c:majorGridlines/>
+        <c:numFmt formatCode="m/d/yy" sourceLinked="1"/>
+        <c:majorTickMark val="out"/>
+        <c:minorTickMark val="none"/>
+        <c:tickLblPos val="nextTo"/>
+        <c:crossAx val="-2111474888"/>
+        <c:crosses val="autoZero"/>
+        <c:auto val="1"/>
+        <c:lblAlgn val="ctr"/>
+        <c:lblOffset val="100"/>
+        <c:noMultiLvlLbl val="0"/>
+      </c:catAx>
+      <c:valAx>
+        <c:axId val="-2111474888"/>
+        <c:scaling>
+          <c:orientation val="minMax"/>
+        </c:scaling>
+        <c:delete val="0"/>
+        <c:axPos val="l"/>
+        <c:majorGridlines/>
+        <c:numFmt formatCode="General" sourceLinked="1"/>
+        <c:majorTickMark val="cross"/>
+        <c:minorTickMark val="none"/>
+        <c:tickLblPos val="nextTo"/>
+        <c:crossAx val="2061718200"/>
+        <c:crosses val="autoZero"/>
+        <c:crossBetween val="between"/>
       </c:valAx>
     </c:plotArea>
     <c:legend>
@@ -1534,6 +2017,110 @@
 </p:sld>
 </file>
 
+<file path=ppt/slides/slide5.xml><?xml version="1.0" encoding="utf-8"?>
+<p:sld xmlns:a="http://schemas.openxmlformats.org/drawingml/2006/main" xmlns:r="http://schemas.openxmlformats.org/officeDocument/2006/relationships" xmlns:p="http://schemas.openxmlformats.org/presentationml/2006/main">
+  <p:cSld>
+    <p:spTree>
+      <p:nvGrpSpPr>
+        <p:cNvPr id="1" name=""/>
+        <p:cNvGrpSpPr/>
+        <p:nvPr/>
+      </p:nvGrpSpPr>
+      <p:grpSpPr>
+        <a:xfrm>
+          <a:off x="0" y="0"/>
+          <a:ext cx="0" cy="0"/>
+          <a:chOff x="0" y="0"/>
+          <a:chExt cx="0" cy="0"/>
+        </a:xfrm>
+      </p:grpSpPr>
+      <p:graphicFrame>
+        <p:nvGraphicFramePr>
+          <p:cNvPr id="2" name="Chart 1"/>
+          <p:cNvGraphicFramePr/>
+          <p:nvPr>
+            <p:extLst>
+              <p:ext uri="{D42A27DB-BD31-4B8C-83A1-F6EECF244321}">
+                <p14:modId xmlns:p14="http://schemas.microsoft.com/office/powerpoint/2010/main" val="345094834"/>
+              </p:ext>
+            </p:extLst>
+          </p:nvPr>
+        </p:nvGraphicFramePr>
+        <p:xfrm>
+          <a:off x="1524000" y="1397000"/>
+          <a:ext cx="6096000" cy="4064000"/>
+        </p:xfrm>
+        <a:graphic>
+          <a:graphicData uri="http://schemas.openxmlformats.org/drawingml/2006/chart">
+            <c:chart xmlns:c="http://schemas.openxmlformats.org/drawingml/2006/chart" xmlns:r="http://schemas.openxmlformats.org/officeDocument/2006/relationships" r:id="rId2"/>
+          </a:graphicData>
+        </a:graphic>
+      </p:graphicFrame>
+    </p:spTree>
+    <p:extLst>
+      <p:ext uri="{BB962C8B-B14F-4D97-AF65-F5344CB8AC3E}">
+        <p14:creationId xmlns:p14="http://schemas.microsoft.com/office/powerpoint/2010/main" val="1428089012"/>
+      </p:ext>
+    </p:extLst>
+  </p:cSld>
+  <p:clrMapOvr>
+    <a:masterClrMapping/>
+  </p:clrMapOvr>
+</p:sld>
+</file>
+
+<file path=ppt/slides/slide6.xml><?xml version="1.0" encoding="utf-8"?>
+<p:sld xmlns:a="http://schemas.openxmlformats.org/drawingml/2006/main" xmlns:r="http://schemas.openxmlformats.org/officeDocument/2006/relationships" xmlns:p="http://schemas.openxmlformats.org/presentationml/2006/main">
+  <p:cSld>
+    <p:spTree>
+      <p:nvGrpSpPr>
+        <p:cNvPr id="1" name=""/>
+        <p:cNvGrpSpPr/>
+        <p:nvPr/>
+      </p:nvGrpSpPr>
+      <p:grpSpPr>
+        <a:xfrm>
+          <a:off x="0" y="0"/>
+          <a:ext cx="0" cy="0"/>
+          <a:chOff x="0" y="0"/>
+          <a:chExt cx="0" cy="0"/>
+        </a:xfrm>
+      </p:grpSpPr>
+      <p:graphicFrame>
+        <p:nvGraphicFramePr>
+          <p:cNvPr id="2" name="Chart 1"/>
+          <p:cNvGraphicFramePr/>
+          <p:nvPr>
+            <p:extLst>
+              <p:ext uri="{D42A27DB-BD31-4B8C-83A1-F6EECF244321}">
+                <p14:modId xmlns:p14="http://schemas.microsoft.com/office/powerpoint/2010/main" val="743992790"/>
+              </p:ext>
+            </p:extLst>
+          </p:nvPr>
+        </p:nvGraphicFramePr>
+        <p:xfrm>
+          <a:off x="1524000" y="1397000"/>
+          <a:ext cx="6096000" cy="4064000"/>
+        </p:xfrm>
+        <a:graphic>
+          <a:graphicData uri="http://schemas.openxmlformats.org/drawingml/2006/chart">
+            <c:chart xmlns:c="http://schemas.openxmlformats.org/drawingml/2006/chart" xmlns:r="http://schemas.openxmlformats.org/officeDocument/2006/relationships" r:id="rId2"/>
+          </a:graphicData>
+        </a:graphic>
+      </p:graphicFrame>
+    </p:spTree>
+    <p:extLst>
+      <p:ext uri="{BB962C8B-B14F-4D97-AF65-F5344CB8AC3E}">
+        <p14:creationId xmlns:p14="http://schemas.microsoft.com/office/powerpoint/2010/main" val="1600831262"/>
+      </p:ext>
+    </p:extLst>
+  </p:cSld>
+  <p:clrMapOvr>
+    <a:masterClrMapping/>
+  </p:clrMapOvr>
+</p:sld>
+</file>
+
 <file path=ppt/theme/theme1.xml><?xml version="1.0" encoding="utf-8"?>
 <a:theme xmlns:a="http://schemas.openxmlformats.org/drawingml/2006/main" name="Office Theme">
   <a:themeElements>

</xml_diff>